<commit_message>
Final Project (with presenter names)
Final Project (with presenter names)
</commit_message>
<xml_diff>
--- a/FakeNewsProjectPresentation.pptx
+++ b/FakeNewsProjectPresentation.pptx
@@ -3574,10 +3574,10 @@
       </p:pic>
       <p:pic>
         <p:nvPicPr>
-          <p:cNvPr id="1042" name="Picture 18" descr="Image result for breitbart news">
-            <a:extLst>
-              <a:ext uri="{FF2B5EF4-FFF2-40B4-BE49-F238E27FC236}">
-                <a16:creationId xmlns:a16="http://schemas.microsoft.com/office/drawing/2014/main" id="{3247E1CF-0E2F-4135-9D8A-B127FB87FC92}"/>
+          <p:cNvPr id="1044" name="Picture 20" descr="Image result for fox news logo">
+            <a:extLst>
+              <a:ext uri="{FF2B5EF4-FFF2-40B4-BE49-F238E27FC236}">
+                <a16:creationId xmlns:a16="http://schemas.microsoft.com/office/drawing/2014/main" id="{B675DA06-911B-46AC-AECD-6DCE210B1F8F}"/>
               </a:ext>
             </a:extLst>
           </p:cNvPr>
@@ -3601,8 +3601,8 @@
         </p:blipFill>
         <p:spPr bwMode="auto">
           <a:xfrm>
-            <a:off x="6571244" y="2806617"/>
-            <a:ext cx="1872108" cy="1446295"/>
+            <a:off x="9037294" y="2683194"/>
+            <a:ext cx="2791065" cy="1569718"/>
           </a:xfrm>
           <a:prstGeom prst="rect">
             <a:avLst/>
@@ -3621,10 +3621,40 @@
       </p:pic>
       <p:pic>
         <p:nvPicPr>
-          <p:cNvPr id="1044" name="Picture 20" descr="Image result for fox news logo">
-            <a:extLst>
-              <a:ext uri="{FF2B5EF4-FFF2-40B4-BE49-F238E27FC236}">
-                <a16:creationId xmlns:a16="http://schemas.microsoft.com/office/drawing/2014/main" id="{B675DA06-911B-46AC-AECD-6DCE210B1F8F}"/>
+          <p:cNvPr id="5" name="Picture 4">
+            <a:extLst>
+              <a:ext uri="{FF2B5EF4-FFF2-40B4-BE49-F238E27FC236}">
+                <a16:creationId xmlns:a16="http://schemas.microsoft.com/office/drawing/2014/main" id="{6FEEB97F-D79D-4C21-BCC1-E160E0460982}"/>
+              </a:ext>
+            </a:extLst>
+          </p:cNvPr>
+          <p:cNvPicPr>
+            <a:picLocks noChangeAspect="1"/>
+          </p:cNvPicPr>
+          <p:nvPr/>
+        </p:nvPicPr>
+        <p:blipFill>
+          <a:blip r:embed="rId8"/>
+          <a:stretch>
+            <a:fillRect/>
+          </a:stretch>
+        </p:blipFill>
+        <p:spPr>
+          <a:xfrm>
+            <a:off x="951247" y="1459011"/>
+            <a:ext cx="4405391" cy="977196"/>
+          </a:xfrm>
+          <a:prstGeom prst="rect">
+            <a:avLst/>
+          </a:prstGeom>
+        </p:spPr>
+      </p:pic>
+      <p:pic>
+        <p:nvPicPr>
+          <p:cNvPr id="1048" name="Picture 24" descr="Related image">
+            <a:extLst>
+              <a:ext uri="{FF2B5EF4-FFF2-40B4-BE49-F238E27FC236}">
+                <a16:creationId xmlns:a16="http://schemas.microsoft.com/office/drawing/2014/main" id="{73BD8269-9739-402A-8267-00B608E67196}"/>
               </a:ext>
             </a:extLst>
           </p:cNvPr>
@@ -3634,7 +3664,7 @@
           <p:nvPr/>
         </p:nvPicPr>
         <p:blipFill>
-          <a:blip r:embed="rId8">
+          <a:blip r:embed="rId9">
             <a:extLst>
               <a:ext uri="{28A0092B-C50C-407E-A947-70E740481C1C}">
                 <a14:useLocalDpi xmlns:a14="http://schemas.microsoft.com/office/drawing/2010/main" val="0"/>
@@ -3648,8 +3678,8 @@
         </p:blipFill>
         <p:spPr bwMode="auto">
           <a:xfrm>
-            <a:off x="9037294" y="2683194"/>
-            <a:ext cx="2791065" cy="1569718"/>
+            <a:off x="2699893" y="2727566"/>
+            <a:ext cx="1723295" cy="1723295"/>
           </a:xfrm>
           <a:prstGeom prst="rect">
             <a:avLst/>
@@ -3668,40 +3698,10 @@
       </p:pic>
       <p:pic>
         <p:nvPicPr>
-          <p:cNvPr id="5" name="Picture 4">
-            <a:extLst>
-              <a:ext uri="{FF2B5EF4-FFF2-40B4-BE49-F238E27FC236}">
-                <a16:creationId xmlns:a16="http://schemas.microsoft.com/office/drawing/2014/main" id="{6FEEB97F-D79D-4C21-BCC1-E160E0460982}"/>
-              </a:ext>
-            </a:extLst>
-          </p:cNvPr>
-          <p:cNvPicPr>
-            <a:picLocks noChangeAspect="1"/>
-          </p:cNvPicPr>
-          <p:nvPr/>
-        </p:nvPicPr>
-        <p:blipFill>
-          <a:blip r:embed="rId9"/>
-          <a:stretch>
-            <a:fillRect/>
-          </a:stretch>
-        </p:blipFill>
-        <p:spPr>
-          <a:xfrm>
-            <a:off x="951247" y="1459011"/>
-            <a:ext cx="4405391" cy="977196"/>
-          </a:xfrm>
-          <a:prstGeom prst="rect">
-            <a:avLst/>
-          </a:prstGeom>
-        </p:spPr>
-      </p:pic>
-      <p:pic>
-        <p:nvPicPr>
-          <p:cNvPr id="1048" name="Picture 24" descr="Related image">
-            <a:extLst>
-              <a:ext uri="{FF2B5EF4-FFF2-40B4-BE49-F238E27FC236}">
-                <a16:creationId xmlns:a16="http://schemas.microsoft.com/office/drawing/2014/main" id="{73BD8269-9739-402A-8267-00B608E67196}"/>
+          <p:cNvPr id="1050" name="Picture 26" descr="Image result for financial times logo">
+            <a:extLst>
+              <a:ext uri="{FF2B5EF4-FFF2-40B4-BE49-F238E27FC236}">
+                <a16:creationId xmlns:a16="http://schemas.microsoft.com/office/drawing/2014/main" id="{E31526EA-C9F9-4EFC-A7BD-C71135949AB8}"/>
               </a:ext>
             </a:extLst>
           </p:cNvPr>
@@ -3725,8 +3725,8 @@
         </p:blipFill>
         <p:spPr bwMode="auto">
           <a:xfrm>
-            <a:off x="3633343" y="2727566"/>
-            <a:ext cx="1723295" cy="1723295"/>
+            <a:off x="7008780" y="1057206"/>
+            <a:ext cx="3602070" cy="1724068"/>
           </a:xfrm>
           <a:prstGeom prst="rect">
             <a:avLst/>
@@ -3743,12 +3743,190 @@
           </a:extLst>
         </p:spPr>
       </p:pic>
+      <p:sp>
+        <p:nvSpPr>
+          <p:cNvPr id="6" name="TextBox 5">
+            <a:extLst>
+              <a:ext uri="{FF2B5EF4-FFF2-40B4-BE49-F238E27FC236}">
+                <a16:creationId xmlns:a16="http://schemas.microsoft.com/office/drawing/2014/main" id="{2DEF5A25-43AC-4E4F-B060-29EB4C23EA85}"/>
+              </a:ext>
+            </a:extLst>
+          </p:cNvPr>
+          <p:cNvSpPr txBox="1"/>
+          <p:nvPr/>
+        </p:nvSpPr>
+        <p:spPr>
+          <a:xfrm>
+            <a:off x="0" y="89284"/>
+            <a:ext cx="12192000" cy="830997"/>
+          </a:xfrm>
+          <a:prstGeom prst="rect">
+            <a:avLst/>
+          </a:prstGeom>
+          <a:noFill/>
+        </p:spPr>
+        <p:txBody>
+          <a:bodyPr wrap="square" rtlCol="0">
+            <a:spAutoFit/>
+          </a:bodyPr>
+          <a:lstStyle/>
+          <a:p>
+            <a:pPr algn="ctr"/>
+            <a:r>
+              <a:rPr lang="en-US" sz="4800" dirty="0">
+                <a:solidFill>
+                  <a:srgbClr val="FF0000"/>
+                </a:solidFill>
+                <a:latin typeface="GNUTypewriter" panose="02000503000000000000" pitchFamily="2" charset="-52"/>
+              </a:rPr>
+              <a:t>Is it REAL or FAKE NEWS?</a:t>
+            </a:r>
+          </a:p>
+        </p:txBody>
+      </p:sp>
+      <p:sp>
+        <p:nvSpPr>
+          <p:cNvPr id="13" name="TextBox 12">
+            <a:extLst>
+              <a:ext uri="{FF2B5EF4-FFF2-40B4-BE49-F238E27FC236}">
+                <a16:creationId xmlns:a16="http://schemas.microsoft.com/office/drawing/2014/main" id="{ABCD6938-7F15-4F21-BA5F-FACA56A9C6A6}"/>
+              </a:ext>
+            </a:extLst>
+          </p:cNvPr>
+          <p:cNvSpPr txBox="1"/>
+          <p:nvPr/>
+        </p:nvSpPr>
+        <p:spPr>
+          <a:xfrm>
+            <a:off x="4096665" y="2694087"/>
+            <a:ext cx="3998670" cy="1600438"/>
+          </a:xfrm>
+          <a:prstGeom prst="rect">
+            <a:avLst/>
+          </a:prstGeom>
+          <a:noFill/>
+        </p:spPr>
+        <p:txBody>
+          <a:bodyPr wrap="square" rtlCol="0">
+            <a:spAutoFit/>
+          </a:bodyPr>
+          <a:lstStyle/>
+          <a:p>
+            <a:pPr algn="ctr"/>
+            <a:r>
+              <a:rPr lang="en-US" sz="1400" b="1" u="sng" dirty="0">
+                <a:solidFill>
+                  <a:srgbClr val="FF0000"/>
+                </a:solidFill>
+                <a:latin typeface="GNUTypewriter" panose="02000503000000000000" pitchFamily="2" charset="-52"/>
+              </a:rPr>
+              <a:t>Presented by </a:t>
+            </a:r>
+          </a:p>
+          <a:p>
+            <a:pPr algn="ctr"/>
+            <a:endParaRPr lang="en-US" sz="1400" b="1" u="sng" dirty="0">
+              <a:solidFill>
+                <a:srgbClr val="FF0000"/>
+              </a:solidFill>
+              <a:latin typeface="GNUTypewriter" panose="02000503000000000000" pitchFamily="2" charset="-52"/>
+            </a:endParaRPr>
+          </a:p>
+          <a:p>
+            <a:pPr algn="ctr"/>
+            <a:r>
+              <a:rPr lang="en-US" sz="1400" b="1" u="sng" dirty="0">
+                <a:solidFill>
+                  <a:srgbClr val="FF0000"/>
+                </a:solidFill>
+                <a:latin typeface="GNUTypewriter" panose="02000503000000000000" pitchFamily="2" charset="-52"/>
+              </a:rPr>
+              <a:t>Richard </a:t>
+            </a:r>
+            <a:r>
+              <a:rPr lang="en-US" sz="1400" b="1" u="sng" dirty="0" err="1">
+                <a:solidFill>
+                  <a:srgbClr val="FF0000"/>
+                </a:solidFill>
+                <a:latin typeface="GNUTypewriter" panose="02000503000000000000" pitchFamily="2" charset="-52"/>
+              </a:rPr>
+              <a:t>Dzidzornu</a:t>
+            </a:r>
+            <a:endParaRPr lang="en-US" sz="1400" b="1" u="sng" dirty="0">
+              <a:solidFill>
+                <a:srgbClr val="FF0000"/>
+              </a:solidFill>
+              <a:latin typeface="GNUTypewriter" panose="02000503000000000000" pitchFamily="2" charset="-52"/>
+            </a:endParaRPr>
+          </a:p>
+          <a:p>
+            <a:pPr algn="ctr"/>
+            <a:r>
+              <a:rPr lang="en-US" sz="1400" b="1" u="sng" dirty="0">
+                <a:solidFill>
+                  <a:srgbClr val="FF0000"/>
+                </a:solidFill>
+                <a:latin typeface="GNUTypewriter" panose="02000503000000000000" pitchFamily="2" charset="-52"/>
+              </a:rPr>
+              <a:t>Richard Paterson</a:t>
+            </a:r>
+          </a:p>
+          <a:p>
+            <a:pPr algn="ctr"/>
+            <a:r>
+              <a:rPr lang="en-US" sz="1400" b="1" u="sng" dirty="0">
+                <a:solidFill>
+                  <a:srgbClr val="FF0000"/>
+                </a:solidFill>
+                <a:latin typeface="GNUTypewriter" panose="02000503000000000000" pitchFamily="2" charset="-52"/>
+              </a:rPr>
+              <a:t>Michael </a:t>
+            </a:r>
+            <a:r>
+              <a:rPr lang="en-US" sz="1400" b="1" u="sng" dirty="0" err="1">
+                <a:solidFill>
+                  <a:srgbClr val="FF0000"/>
+                </a:solidFill>
+                <a:latin typeface="GNUTypewriter" panose="02000503000000000000" pitchFamily="2" charset="-52"/>
+              </a:rPr>
+              <a:t>Znidarsic</a:t>
+            </a:r>
+            <a:endParaRPr lang="en-US" sz="1400" b="1" u="sng" dirty="0">
+              <a:solidFill>
+                <a:srgbClr val="FF0000"/>
+              </a:solidFill>
+              <a:latin typeface="GNUTypewriter" panose="02000503000000000000" pitchFamily="2" charset="-52"/>
+            </a:endParaRPr>
+          </a:p>
+          <a:p>
+            <a:pPr algn="ctr"/>
+            <a:endParaRPr lang="en-US" sz="1400" b="1" u="sng" dirty="0">
+              <a:solidFill>
+                <a:srgbClr val="FF0000"/>
+              </a:solidFill>
+              <a:latin typeface="GNUTypewriter" panose="02000503000000000000" pitchFamily="2" charset="-52"/>
+            </a:endParaRPr>
+          </a:p>
+          <a:p>
+            <a:pPr algn="ctr"/>
+            <a:r>
+              <a:rPr lang="en-US" sz="1400" b="1" u="sng" dirty="0">
+                <a:solidFill>
+                  <a:srgbClr val="FF0000"/>
+                </a:solidFill>
+                <a:latin typeface="GNUTypewriter" panose="02000503000000000000" pitchFamily="2" charset="-52"/>
+              </a:rPr>
+              <a:t>12/4/2019</a:t>
+            </a:r>
+          </a:p>
+        </p:txBody>
+      </p:sp>
       <p:pic>
         <p:nvPicPr>
-          <p:cNvPr id="1050" name="Picture 26" descr="Image result for financial times logo">
-            <a:extLst>
-              <a:ext uri="{FF2B5EF4-FFF2-40B4-BE49-F238E27FC236}">
-                <a16:creationId xmlns:a16="http://schemas.microsoft.com/office/drawing/2014/main" id="{E31526EA-C9F9-4EFC-A7BD-C71135949AB8}"/>
+          <p:cNvPr id="1042" name="Picture 18" descr="Image result for breitbart news">
+            <a:extLst>
+              <a:ext uri="{FF2B5EF4-FFF2-40B4-BE49-F238E27FC236}">
+                <a16:creationId xmlns:a16="http://schemas.microsoft.com/office/drawing/2014/main" id="{3247E1CF-0E2F-4135-9D8A-B127FB87FC92}"/>
               </a:ext>
             </a:extLst>
           </p:cNvPr>
@@ -3772,8 +3950,8 @@
         </p:blipFill>
         <p:spPr bwMode="auto">
           <a:xfrm>
-            <a:off x="7008780" y="1057206"/>
-            <a:ext cx="3602070" cy="1724068"/>
+            <a:off x="7533269" y="2806617"/>
+            <a:ext cx="1872108" cy="1446295"/>
           </a:xfrm>
           <a:prstGeom prst="rect">
             <a:avLst/>
@@ -3790,47 +3968,6 @@
           </a:extLst>
         </p:spPr>
       </p:pic>
-      <p:sp>
-        <p:nvSpPr>
-          <p:cNvPr id="6" name="TextBox 5">
-            <a:extLst>
-              <a:ext uri="{FF2B5EF4-FFF2-40B4-BE49-F238E27FC236}">
-                <a16:creationId xmlns:a16="http://schemas.microsoft.com/office/drawing/2014/main" id="{2DEF5A25-43AC-4E4F-B060-29EB4C23EA85}"/>
-              </a:ext>
-            </a:extLst>
-          </p:cNvPr>
-          <p:cNvSpPr txBox="1"/>
-          <p:nvPr/>
-        </p:nvSpPr>
-        <p:spPr>
-          <a:xfrm>
-            <a:off x="0" y="89284"/>
-            <a:ext cx="12192000" cy="830997"/>
-          </a:xfrm>
-          <a:prstGeom prst="rect">
-            <a:avLst/>
-          </a:prstGeom>
-          <a:noFill/>
-        </p:spPr>
-        <p:txBody>
-          <a:bodyPr wrap="square" rtlCol="0">
-            <a:spAutoFit/>
-          </a:bodyPr>
-          <a:lstStyle/>
-          <a:p>
-            <a:pPr algn="ctr"/>
-            <a:r>
-              <a:rPr lang="en-US" sz="4800" dirty="0">
-                <a:solidFill>
-                  <a:srgbClr val="FF0000"/>
-                </a:solidFill>
-                <a:latin typeface="GNUTypewriter" panose="02000503000000000000" pitchFamily="2" charset="-52"/>
-              </a:rPr>
-              <a:t>Is it REAL or FAKE NEWS?</a:t>
-            </a:r>
-          </a:p>
-        </p:txBody>
-      </p:sp>
     </p:spTree>
     <p:extLst>
       <p:ext uri="{BB962C8B-B14F-4D97-AF65-F5344CB8AC3E}">
@@ -7462,7 +7599,7 @@
               <a:rPr lang="en-US" sz="1600" dirty="0">
                 <a:latin typeface="GNUTypewriter" panose="02000503000000000000" pitchFamily="2" charset="-52"/>
               </a:rPr>
-              <a:t>As an example, we tested /Infowars Monday Quarterbacking Political Review containing 800 words, 3 paragraphs, author = unknown). Results are:</a:t>
+              <a:t>As an example, we tested /Infowars Monday Quarterbacking Political Review containing 800 words, 3 paragraphs, author = unknown). Model results are:</a:t>
             </a:r>
           </a:p>
         </p:txBody>
@@ -7499,7 +7636,7 @@
               <a:rPr lang="en-US" sz="1600" dirty="0">
                 <a:latin typeface="GNUTypewriter" panose="02000503000000000000" pitchFamily="2" charset="-52"/>
               </a:rPr>
-              <a:t>Objective is to put a document through our “Is It Real News” Engine (which consists of a number of trained models), and the Engine will give back an “Is It Real News” Score.</a:t>
+              <a:t>Our intention is to put individual documents through our “Is It Real News” Engine (which consists of a number of trained models), and the Engine will give back an “Is It Real News” Score/Prediction.</a:t>
             </a:r>
           </a:p>
         </p:txBody>

</xml_diff>